<commit_message>
Update Random forest  presentation slides and results.pptx
Added problem slide
</commit_message>
<xml_diff>
--- a/Random forest code and result slides/Random forest  presentation slides and results.pptx
+++ b/Random forest code and result slides/Random forest  presentation slides and results.pptx
@@ -5,17 +5,18 @@
     <p:sldMasterId id="2147483648" r:id="rId1"/>
   </p:sldMasterIdLst>
   <p:notesMasterIdLst>
-    <p:notesMasterId r:id="rId10"/>
+    <p:notesMasterId r:id="rId11"/>
   </p:notesMasterIdLst>
   <p:sldIdLst>
     <p:sldId id="260" r:id="rId2"/>
     <p:sldId id="259" r:id="rId3"/>
-    <p:sldId id="258" r:id="rId4"/>
-    <p:sldId id="261" r:id="rId5"/>
-    <p:sldId id="262" r:id="rId6"/>
-    <p:sldId id="263" r:id="rId7"/>
-    <p:sldId id="264" r:id="rId8"/>
-    <p:sldId id="265" r:id="rId9"/>
+    <p:sldId id="266" r:id="rId4"/>
+    <p:sldId id="258" r:id="rId5"/>
+    <p:sldId id="261" r:id="rId6"/>
+    <p:sldId id="262" r:id="rId7"/>
+    <p:sldId id="263" r:id="rId8"/>
+    <p:sldId id="264" r:id="rId9"/>
+    <p:sldId id="265" r:id="rId10"/>
   </p:sldIdLst>
   <p:sldSz cx="12192000" cy="6858000"/>
   <p:notesSz cx="6858000" cy="9144000"/>
@@ -125,13 +126,60 @@
 <file path=ppt/revisionInfo.xml><?xml version="1.0" encoding="utf-8"?>
 <p1510:revInfo xmlns:a="http://schemas.openxmlformats.org/drawingml/2006/main" xmlns:r="http://schemas.openxmlformats.org/officeDocument/2006/relationships" xmlns:p1510="http://schemas.microsoft.com/office/powerpoint/2015/10/main">
   <p1510:revLst>
-    <p1510:client id="{52855764-3F8C-415E-A34C-84EE33ED3389}" v="99" dt="2022-05-13T08:24:55.083"/>
+    <p1510:client id="{B203C5AB-9EC4-41FA-9561-CCC90BC70909}" v="1" dt="2022-05-15T10:03:16.637"/>
   </p1510:revLst>
 </p1510:revInfo>
 </file>
 
 <file path=ppt/changesInfos/changesInfo1.xml><?xml version="1.0" encoding="utf-8"?>
 <pc:chgInfo xmlns:a="http://schemas.openxmlformats.org/drawingml/2006/main" xmlns:r="http://schemas.openxmlformats.org/officeDocument/2006/relationships" xmlns:ac="http://schemas.microsoft.com/office/drawing/2013/main/command" xmlns:pc="http://schemas.microsoft.com/office/powerpoint/2013/main/command">
+  <pc:docChgLst>
+    <pc:chgData name="Hui Li" userId="ec3be2d1-c9fc-4ef5-8c05-8d8ca9dfaab4" providerId="ADAL" clId="{B203C5AB-9EC4-41FA-9561-CCC90BC70909}"/>
+    <pc:docChg chg="custSel addSld modSld">
+      <pc:chgData name="Hui Li" userId="ec3be2d1-c9fc-4ef5-8c05-8d8ca9dfaab4" providerId="ADAL" clId="{B203C5AB-9EC4-41FA-9561-CCC90BC70909}" dt="2022-05-15T10:03:30.038" v="212" actId="255"/>
+      <pc:docMkLst>
+        <pc:docMk/>
+      </pc:docMkLst>
+      <pc:sldChg chg="modNotesTx">
+        <pc:chgData name="Hui Li" userId="ec3be2d1-c9fc-4ef5-8c05-8d8ca9dfaab4" providerId="ADAL" clId="{B203C5AB-9EC4-41FA-9561-CCC90BC70909}" dt="2022-05-15T09:50:38.212" v="0" actId="6549"/>
+        <pc:sldMkLst>
+          <pc:docMk/>
+          <pc:sldMk cId="1216946136" sldId="259"/>
+        </pc:sldMkLst>
+      </pc:sldChg>
+      <pc:sldChg chg="addSp delSp modSp new mod">
+        <pc:chgData name="Hui Li" userId="ec3be2d1-c9fc-4ef5-8c05-8d8ca9dfaab4" providerId="ADAL" clId="{B203C5AB-9EC4-41FA-9561-CCC90BC70909}" dt="2022-05-15T10:03:30.038" v="212" actId="255"/>
+        <pc:sldMkLst>
+          <pc:docMk/>
+          <pc:sldMk cId="3832634048" sldId="266"/>
+        </pc:sldMkLst>
+        <pc:spChg chg="add del mod">
+          <ac:chgData name="Hui Li" userId="ec3be2d1-c9fc-4ef5-8c05-8d8ca9dfaab4" providerId="ADAL" clId="{B203C5AB-9EC4-41FA-9561-CCC90BC70909}" dt="2022-05-15T09:55:39.362" v="49" actId="478"/>
+          <ac:spMkLst>
+            <pc:docMk/>
+            <pc:sldMk cId="3832634048" sldId="266"/>
+            <ac:spMk id="3" creationId="{DA19CF38-3A3A-0DF2-74A8-93A8E1566949}"/>
+          </ac:spMkLst>
+        </pc:spChg>
+        <pc:spChg chg="add mod">
+          <ac:chgData name="Hui Li" userId="ec3be2d1-c9fc-4ef5-8c05-8d8ca9dfaab4" providerId="ADAL" clId="{B203C5AB-9EC4-41FA-9561-CCC90BC70909}" dt="2022-05-15T10:01:46.770" v="201" actId="20577"/>
+          <ac:spMkLst>
+            <pc:docMk/>
+            <pc:sldMk cId="3832634048" sldId="266"/>
+            <ac:spMk id="5" creationId="{3326DA0F-9080-4916-1B24-5DDCF348B478}"/>
+          </ac:spMkLst>
+        </pc:spChg>
+        <pc:spChg chg="add mod">
+          <ac:chgData name="Hui Li" userId="ec3be2d1-c9fc-4ef5-8c05-8d8ca9dfaab4" providerId="ADAL" clId="{B203C5AB-9EC4-41FA-9561-CCC90BC70909}" dt="2022-05-15T10:03:30.038" v="212" actId="255"/>
+          <ac:spMkLst>
+            <pc:docMk/>
+            <pc:sldMk cId="3832634048" sldId="266"/>
+            <ac:spMk id="6" creationId="{4E8F03FE-3F10-E150-F30E-3AE42A050119}"/>
+          </ac:spMkLst>
+        </pc:spChg>
+      </pc:sldChg>
+    </pc:docChg>
+  </pc:docChgLst>
   <pc:docChgLst>
     <pc:chgData name="Hui Li" userId="ec3be2d1-c9fc-4ef5-8c05-8d8ca9dfaab4" providerId="ADAL" clId="{52855764-3F8C-415E-A34C-84EE33ED3389}"/>
     <pc:docChg chg="undo custSel addSld delSld modSld sldOrd">
@@ -1679,7 +1727,7 @@
           <a:p>
             <a:fld id="{12DD2E4D-7FC5-441C-A7D7-F20F14AAA1B7}" type="datetimeFigureOut">
               <a:rPr lang="en-AU" smtClean="0"/>
-              <a:t>13/05/2022</a:t>
+              <a:t>15/05/2022</a:t>
             </a:fld>
             <a:endParaRPr lang="en-AU"/>
           </a:p>
@@ -2107,7 +2155,7 @@
           <a:p>
             <a:r>
               <a:rPr lang="en-AU" dirty="0"/>
-              <a:t>In all the variables, only the number of diagnoses has p value less than 0.05, suggesting number of diagnosis is the key factor affecting whether the readmission of patients.</a:t>
+              <a:t>In all the variables, only the number of diagnoses has p value less than 0.05, suggesting number of diagnosis is the key factor affecting the readmission of patients.</a:t>
             </a:r>
           </a:p>
         </p:txBody>
@@ -2213,7 +2261,7 @@
           <a:p>
             <a:fld id="{7AFBF99F-B851-4A8F-8F4D-F3B0275C9B6F}" type="slidenum">
               <a:rPr lang="en-AU" smtClean="0"/>
-              <a:t>6</a:t>
+              <a:t>7</a:t>
             </a:fld>
             <a:endParaRPr lang="en-AU"/>
           </a:p>
@@ -2381,7 +2429,7 @@
           <a:p>
             <a:fld id="{ABA23B9A-771B-4B5F-9129-E92718FEFCBC}" type="datetimeFigureOut">
               <a:rPr lang="en-AU" smtClean="0"/>
-              <a:t>13/05/2022</a:t>
+              <a:t>15/05/2022</a:t>
             </a:fld>
             <a:endParaRPr lang="en-AU"/>
           </a:p>
@@ -2581,7 +2629,7 @@
           <a:p>
             <a:fld id="{ABA23B9A-771B-4B5F-9129-E92718FEFCBC}" type="datetimeFigureOut">
               <a:rPr lang="en-AU" smtClean="0"/>
-              <a:t>13/05/2022</a:t>
+              <a:t>15/05/2022</a:t>
             </a:fld>
             <a:endParaRPr lang="en-AU"/>
           </a:p>
@@ -2791,7 +2839,7 @@
           <a:p>
             <a:fld id="{ABA23B9A-771B-4B5F-9129-E92718FEFCBC}" type="datetimeFigureOut">
               <a:rPr lang="en-AU" smtClean="0"/>
-              <a:t>13/05/2022</a:t>
+              <a:t>15/05/2022</a:t>
             </a:fld>
             <a:endParaRPr lang="en-AU"/>
           </a:p>
@@ -2991,7 +3039,7 @@
           <a:p>
             <a:fld id="{ABA23B9A-771B-4B5F-9129-E92718FEFCBC}" type="datetimeFigureOut">
               <a:rPr lang="en-AU" smtClean="0"/>
-              <a:t>13/05/2022</a:t>
+              <a:t>15/05/2022</a:t>
             </a:fld>
             <a:endParaRPr lang="en-AU"/>
           </a:p>
@@ -3267,7 +3315,7 @@
           <a:p>
             <a:fld id="{ABA23B9A-771B-4B5F-9129-E92718FEFCBC}" type="datetimeFigureOut">
               <a:rPr lang="en-AU" smtClean="0"/>
-              <a:t>13/05/2022</a:t>
+              <a:t>15/05/2022</a:t>
             </a:fld>
             <a:endParaRPr lang="en-AU"/>
           </a:p>
@@ -3535,7 +3583,7 @@
           <a:p>
             <a:fld id="{ABA23B9A-771B-4B5F-9129-E92718FEFCBC}" type="datetimeFigureOut">
               <a:rPr lang="en-AU" smtClean="0"/>
-              <a:t>13/05/2022</a:t>
+              <a:t>15/05/2022</a:t>
             </a:fld>
             <a:endParaRPr lang="en-AU"/>
           </a:p>
@@ -3950,7 +3998,7 @@
           <a:p>
             <a:fld id="{ABA23B9A-771B-4B5F-9129-E92718FEFCBC}" type="datetimeFigureOut">
               <a:rPr lang="en-AU" smtClean="0"/>
-              <a:t>13/05/2022</a:t>
+              <a:t>15/05/2022</a:t>
             </a:fld>
             <a:endParaRPr lang="en-AU"/>
           </a:p>
@@ -4092,7 +4140,7 @@
           <a:p>
             <a:fld id="{ABA23B9A-771B-4B5F-9129-E92718FEFCBC}" type="datetimeFigureOut">
               <a:rPr lang="en-AU" smtClean="0"/>
-              <a:t>13/05/2022</a:t>
+              <a:t>15/05/2022</a:t>
             </a:fld>
             <a:endParaRPr lang="en-AU"/>
           </a:p>
@@ -4205,7 +4253,7 @@
           <a:p>
             <a:fld id="{ABA23B9A-771B-4B5F-9129-E92718FEFCBC}" type="datetimeFigureOut">
               <a:rPr lang="en-AU" smtClean="0"/>
-              <a:t>13/05/2022</a:t>
+              <a:t>15/05/2022</a:t>
             </a:fld>
             <a:endParaRPr lang="en-AU"/>
           </a:p>
@@ -4518,7 +4566,7 @@
           <a:p>
             <a:fld id="{ABA23B9A-771B-4B5F-9129-E92718FEFCBC}" type="datetimeFigureOut">
               <a:rPr lang="en-AU" smtClean="0"/>
-              <a:t>13/05/2022</a:t>
+              <a:t>15/05/2022</a:t>
             </a:fld>
             <a:endParaRPr lang="en-AU"/>
           </a:p>
@@ -4807,7 +4855,7 @@
           <a:p>
             <a:fld id="{ABA23B9A-771B-4B5F-9129-E92718FEFCBC}" type="datetimeFigureOut">
               <a:rPr lang="en-AU" smtClean="0"/>
-              <a:t>13/05/2022</a:t>
+              <a:t>15/05/2022</a:t>
             </a:fld>
             <a:endParaRPr lang="en-AU"/>
           </a:p>
@@ -5050,7 +5098,7 @@
           <a:p>
             <a:fld id="{ABA23B9A-771B-4B5F-9129-E92718FEFCBC}" type="datetimeFigureOut">
               <a:rPr lang="en-AU" smtClean="0"/>
-              <a:t>13/05/2022</a:t>
+              <a:t>15/05/2022</a:t>
             </a:fld>
             <a:endParaRPr lang="en-AU"/>
           </a:p>
@@ -6906,6 +6954,222 @@
           <a:chExt cx="0" cy="0"/>
         </a:xfrm>
       </p:grpSpPr>
+      <p:sp>
+        <p:nvSpPr>
+          <p:cNvPr id="5" name="TextBox 4">
+            <a:extLst>
+              <a:ext uri="{FF2B5EF4-FFF2-40B4-BE49-F238E27FC236}">
+                <a16:creationId xmlns:a16="http://schemas.microsoft.com/office/drawing/2014/main" id="{3326DA0F-9080-4916-1B24-5DDCF348B478}"/>
+              </a:ext>
+            </a:extLst>
+          </p:cNvPr>
+          <p:cNvSpPr txBox="1"/>
+          <p:nvPr/>
+        </p:nvSpPr>
+        <p:spPr>
+          <a:xfrm>
+            <a:off x="1277006" y="1372389"/>
+            <a:ext cx="9469821" cy="3416320"/>
+          </a:xfrm>
+          <a:prstGeom prst="rect">
+            <a:avLst/>
+          </a:prstGeom>
+          <a:noFill/>
+        </p:spPr>
+        <p:txBody>
+          <a:bodyPr wrap="square">
+            <a:spAutoFit/>
+          </a:bodyPr>
+          <a:lstStyle/>
+          <a:p>
+            <a:pPr marL="285750" indent="-285750">
+              <a:buFont typeface="Arial" panose="020B0604020202020204" pitchFamily="34" charset="0"/>
+              <a:buChar char="•"/>
+            </a:pPr>
+            <a:r>
+              <a:rPr lang="en-US" b="0" i="0" dirty="0">
+                <a:effectLst/>
+                <a:latin typeface="Arial" panose="020B0604020202020204" pitchFamily="34" charset="0"/>
+              </a:rPr>
+              <a:t>Hospitalized diabetes patients have a higher risk of hospital readmission.</a:t>
+            </a:r>
+          </a:p>
+          <a:p>
+            <a:pPr marL="285750" indent="-285750">
+              <a:buFont typeface="Arial" panose="020B0604020202020204" pitchFamily="34" charset="0"/>
+              <a:buChar char="•"/>
+            </a:pPr>
+            <a:endParaRPr lang="en-US" dirty="0">
+              <a:latin typeface="Arial" panose="020B0604020202020204" pitchFamily="34" charset="0"/>
+            </a:endParaRPr>
+          </a:p>
+          <a:p>
+            <a:pPr marL="285750" indent="-285750">
+              <a:buFont typeface="Arial" panose="020B0604020202020204" pitchFamily="34" charset="0"/>
+              <a:buChar char="•"/>
+            </a:pPr>
+            <a:r>
+              <a:rPr lang="en-US" b="0" i="0" dirty="0">
+                <a:effectLst/>
+                <a:latin typeface="Arial" panose="020B0604020202020204" pitchFamily="34" charset="0"/>
+              </a:rPr>
+              <a:t>This generates significant burden to the patients and the health care system.</a:t>
+            </a:r>
+          </a:p>
+          <a:p>
+            <a:pPr marL="285750" indent="-285750">
+              <a:buFont typeface="Arial" panose="020B0604020202020204" pitchFamily="34" charset="0"/>
+              <a:buChar char="•"/>
+            </a:pPr>
+            <a:endParaRPr lang="en-US" dirty="0">
+              <a:latin typeface="Arial" panose="020B0604020202020204" pitchFamily="34" charset="0"/>
+            </a:endParaRPr>
+          </a:p>
+          <a:p>
+            <a:pPr marL="285750" indent="-285750">
+              <a:buFont typeface="Arial" panose="020B0604020202020204" pitchFamily="34" charset="0"/>
+              <a:buChar char="•"/>
+            </a:pPr>
+            <a:r>
+              <a:rPr lang="en-US" b="0" i="0" dirty="0">
+                <a:effectLst/>
+                <a:latin typeface="Arial" panose="020B0604020202020204" pitchFamily="34" charset="0"/>
+              </a:rPr>
+              <a:t>In this study, we will use classification algorithms to:</a:t>
+            </a:r>
+          </a:p>
+          <a:p>
+            <a:pPr marL="285750" indent="-285750">
+              <a:buFont typeface="Arial" panose="020B0604020202020204" pitchFamily="34" charset="0"/>
+              <a:buChar char="•"/>
+            </a:pPr>
+            <a:endParaRPr lang="en-US" b="0" i="0" dirty="0">
+              <a:effectLst/>
+              <a:latin typeface="Arial" panose="020B0604020202020204" pitchFamily="34" charset="0"/>
+            </a:endParaRPr>
+          </a:p>
+          <a:p>
+            <a:pPr marL="800100" lvl="1" indent="-342900">
+              <a:buAutoNum type="arabicParenR"/>
+            </a:pPr>
+            <a:r>
+              <a:rPr lang="en-US" b="0" i="0" dirty="0">
+                <a:effectLst/>
+                <a:latin typeface="Arial" panose="020B0604020202020204" pitchFamily="34" charset="0"/>
+              </a:rPr>
+              <a:t>predict whether the diabetes patients will be readmitted to hospital within 30 days or after 30 days, or will not be readmitted.</a:t>
+            </a:r>
+          </a:p>
+          <a:p>
+            <a:pPr marL="800100" lvl="1" indent="-342900">
+              <a:buAutoNum type="arabicParenR"/>
+            </a:pPr>
+            <a:endParaRPr lang="en-US" b="0" i="0" dirty="0">
+              <a:effectLst/>
+              <a:latin typeface="Arial" panose="020B0604020202020204" pitchFamily="34" charset="0"/>
+            </a:endParaRPr>
+          </a:p>
+          <a:p>
+            <a:pPr marL="800100" lvl="1" indent="-342900">
+              <a:buAutoNum type="arabicParenR" startAt="2"/>
+            </a:pPr>
+            <a:r>
+              <a:rPr lang="en-US" b="0" i="0" dirty="0">
+                <a:effectLst/>
+                <a:latin typeface="Arial" panose="020B0604020202020204" pitchFamily="34" charset="0"/>
+              </a:rPr>
+              <a:t>identify the potential factors affecting the readmission of diabetes patients.</a:t>
+            </a:r>
+          </a:p>
+          <a:p>
+            <a:pPr marL="800100" lvl="1" indent="-342900">
+              <a:buAutoNum type="arabicParenR" startAt="2"/>
+            </a:pPr>
+            <a:endParaRPr lang="en-US" b="0" i="0" dirty="0">
+              <a:effectLst/>
+              <a:latin typeface="Arial" panose="020B0604020202020204" pitchFamily="34" charset="0"/>
+            </a:endParaRPr>
+          </a:p>
+          <a:p>
+            <a:pPr marL="285750" lvl="1" indent="-285750">
+              <a:buFont typeface="Arial" panose="020B0604020202020204" pitchFamily="34" charset="0"/>
+              <a:buChar char="•"/>
+            </a:pPr>
+            <a:r>
+              <a:rPr lang="en-US" dirty="0">
+                <a:latin typeface="Arial" panose="020B0604020202020204" pitchFamily="34" charset="0"/>
+              </a:rPr>
+              <a:t>The results will reduce the readmission of diabetes patients and health burden.</a:t>
+            </a:r>
+            <a:endParaRPr lang="en-AU" dirty="0"/>
+          </a:p>
+        </p:txBody>
+      </p:sp>
+      <p:sp>
+        <p:nvSpPr>
+          <p:cNvPr id="6" name="TextBox 5">
+            <a:extLst>
+              <a:ext uri="{FF2B5EF4-FFF2-40B4-BE49-F238E27FC236}">
+                <a16:creationId xmlns:a16="http://schemas.microsoft.com/office/drawing/2014/main" id="{4E8F03FE-3F10-E150-F30E-3AE42A050119}"/>
+              </a:ext>
+            </a:extLst>
+          </p:cNvPr>
+          <p:cNvSpPr txBox="1"/>
+          <p:nvPr/>
+        </p:nvSpPr>
+        <p:spPr>
+          <a:xfrm>
+            <a:off x="5018952" y="546538"/>
+            <a:ext cx="1085618" cy="400110"/>
+          </a:xfrm>
+          <a:prstGeom prst="rect">
+            <a:avLst/>
+          </a:prstGeom>
+          <a:noFill/>
+        </p:spPr>
+        <p:txBody>
+          <a:bodyPr wrap="none" rtlCol="0">
+            <a:spAutoFit/>
+          </a:bodyPr>
+          <a:lstStyle/>
+          <a:p>
+            <a:r>
+              <a:rPr lang="en-AU" sz="2000" b="1" dirty="0"/>
+              <a:t>Problem</a:t>
+            </a:r>
+          </a:p>
+        </p:txBody>
+      </p:sp>
+    </p:spTree>
+    <p:extLst>
+      <p:ext uri="{BB962C8B-B14F-4D97-AF65-F5344CB8AC3E}">
+        <p14:creationId xmlns:p14="http://schemas.microsoft.com/office/powerpoint/2010/main" val="3832634048"/>
+      </p:ext>
+    </p:extLst>
+  </p:cSld>
+  <p:clrMapOvr>
+    <a:masterClrMapping/>
+  </p:clrMapOvr>
+</p:sld>
+</file>
+
+<file path=ppt/slides/slide4.xml><?xml version="1.0" encoding="utf-8"?>
+<p:sld xmlns:a="http://schemas.openxmlformats.org/drawingml/2006/main" xmlns:r="http://schemas.openxmlformats.org/officeDocument/2006/relationships" xmlns:p="http://schemas.openxmlformats.org/presentationml/2006/main">
+  <p:cSld>
+    <p:spTree>
+      <p:nvGrpSpPr>
+        <p:cNvPr id="1" name=""/>
+        <p:cNvGrpSpPr/>
+        <p:nvPr/>
+      </p:nvGrpSpPr>
+      <p:grpSpPr>
+        <a:xfrm>
+          <a:off x="0" y="0"/>
+          <a:ext cx="0" cy="0"/>
+          <a:chOff x="0" y="0"/>
+          <a:chExt cx="0" cy="0"/>
+        </a:xfrm>
+      </p:grpSpPr>
       <p:grpSp>
         <p:nvGrpSpPr>
           <p:cNvPr id="33" name="Group 32">
@@ -7333,7 +7597,7 @@
 </p:sld>
 </file>
 
-<file path=ppt/slides/slide4.xml><?xml version="1.0" encoding="utf-8"?>
+<file path=ppt/slides/slide5.xml><?xml version="1.0" encoding="utf-8"?>
 <p:sld xmlns:a="http://schemas.openxmlformats.org/drawingml/2006/main" xmlns:r="http://schemas.openxmlformats.org/officeDocument/2006/relationships" xmlns:p="http://schemas.openxmlformats.org/presentationml/2006/main">
   <p:cSld>
     <p:spTree>
@@ -7881,7 +8145,7 @@
 </p:sld>
 </file>
 
-<file path=ppt/slides/slide5.xml><?xml version="1.0" encoding="utf-8"?>
+<file path=ppt/slides/slide6.xml><?xml version="1.0" encoding="utf-8"?>
 <p:sld xmlns:a="http://schemas.openxmlformats.org/drawingml/2006/main" xmlns:r="http://schemas.openxmlformats.org/officeDocument/2006/relationships" xmlns:p="http://schemas.openxmlformats.org/presentationml/2006/main">
   <p:cSld>
     <p:spTree>
@@ -8311,7 +8575,7 @@
 </p:sld>
 </file>
 
-<file path=ppt/slides/slide6.xml><?xml version="1.0" encoding="utf-8"?>
+<file path=ppt/slides/slide7.xml><?xml version="1.0" encoding="utf-8"?>
 <p:sld xmlns:a="http://schemas.openxmlformats.org/drawingml/2006/main" xmlns:r="http://schemas.openxmlformats.org/officeDocument/2006/relationships" xmlns:p="http://schemas.openxmlformats.org/presentationml/2006/main">
   <p:cSld>
     <p:spTree>
@@ -8847,7 +9111,7 @@
 </p:sld>
 </file>
 
-<file path=ppt/slides/slide7.xml><?xml version="1.0" encoding="utf-8"?>
+<file path=ppt/slides/slide8.xml><?xml version="1.0" encoding="utf-8"?>
 <p:sld xmlns:a="http://schemas.openxmlformats.org/drawingml/2006/main" xmlns:r="http://schemas.openxmlformats.org/officeDocument/2006/relationships" xmlns:p="http://schemas.openxmlformats.org/presentationml/2006/main">
   <p:cSld>
     <p:spTree>
@@ -8947,7 +9211,7 @@
 </p:sld>
 </file>
 
-<file path=ppt/slides/slide8.xml><?xml version="1.0" encoding="utf-8"?>
+<file path=ppt/slides/slide9.xml><?xml version="1.0" encoding="utf-8"?>
 <p:sld xmlns:a="http://schemas.openxmlformats.org/drawingml/2006/main" xmlns:r="http://schemas.openxmlformats.org/officeDocument/2006/relationships" xmlns:p="http://schemas.openxmlformats.org/presentationml/2006/main">
   <p:cSld>
     <p:spTree>

</xml_diff>